<commit_message>
updated prepare_your_online_study.pptx with instructions for OpenSesame v4
</commit_message>
<xml_diff>
--- a/docs/prepare_your_online_study.pptx
+++ b/docs/prepare_your_online_study.pptx
@@ -11,6 +11,12 @@
     <p:sldId id="264" r:id="rId8"/>
     <p:sldId id="265" r:id="rId9"/>
     <p:sldId id="266" r:id="rId10"/>
+    <p:sldId id="275" r:id="rId11"/>
+    <p:sldId id="268" r:id="rId12"/>
+    <p:sldId id="270" r:id="rId13"/>
+    <p:sldId id="274" r:id="rId14"/>
+    <p:sldId id="271" r:id="rId15"/>
+    <p:sldId id="273" r:id="rId16"/>
   </p:sldIdLst>
   <p:sldSz cx="12192000" cy="6858000"/>
   <p:notesSz cx="6858000" cy="9144000"/>
@@ -256,7 +262,7 @@
           <a:p>
             <a:fld id="{448139F4-DCF3-46DE-86AD-02E68B534781}" type="datetimeFigureOut">
               <a:rPr lang="en-GB" smtClean="0"/>
-              <a:t>07/03/2023</a:t>
+              <a:t>19/02/2024</a:t>
             </a:fld>
             <a:endParaRPr lang="en-GB"/>
           </a:p>
@@ -426,7 +432,7 @@
           <a:p>
             <a:fld id="{448139F4-DCF3-46DE-86AD-02E68B534781}" type="datetimeFigureOut">
               <a:rPr lang="en-GB" smtClean="0"/>
-              <a:t>07/03/2023</a:t>
+              <a:t>19/02/2024</a:t>
             </a:fld>
             <a:endParaRPr lang="en-GB"/>
           </a:p>
@@ -606,7 +612,7 @@
           <a:p>
             <a:fld id="{448139F4-DCF3-46DE-86AD-02E68B534781}" type="datetimeFigureOut">
               <a:rPr lang="en-GB" smtClean="0"/>
-              <a:t>07/03/2023</a:t>
+              <a:t>19/02/2024</a:t>
             </a:fld>
             <a:endParaRPr lang="en-GB"/>
           </a:p>
@@ -776,7 +782,7 @@
           <a:p>
             <a:fld id="{448139F4-DCF3-46DE-86AD-02E68B534781}" type="datetimeFigureOut">
               <a:rPr lang="en-GB" smtClean="0"/>
-              <a:t>07/03/2023</a:t>
+              <a:t>19/02/2024</a:t>
             </a:fld>
             <a:endParaRPr lang="en-GB"/>
           </a:p>
@@ -1022,7 +1028,7 @@
           <a:p>
             <a:fld id="{448139F4-DCF3-46DE-86AD-02E68B534781}" type="datetimeFigureOut">
               <a:rPr lang="en-GB" smtClean="0"/>
-              <a:t>07/03/2023</a:t>
+              <a:t>19/02/2024</a:t>
             </a:fld>
             <a:endParaRPr lang="en-GB"/>
           </a:p>
@@ -1254,7 +1260,7 @@
           <a:p>
             <a:fld id="{448139F4-DCF3-46DE-86AD-02E68B534781}" type="datetimeFigureOut">
               <a:rPr lang="en-GB" smtClean="0"/>
-              <a:t>07/03/2023</a:t>
+              <a:t>19/02/2024</a:t>
             </a:fld>
             <a:endParaRPr lang="en-GB"/>
           </a:p>
@@ -1621,7 +1627,7 @@
           <a:p>
             <a:fld id="{448139F4-DCF3-46DE-86AD-02E68B534781}" type="datetimeFigureOut">
               <a:rPr lang="en-GB" smtClean="0"/>
-              <a:t>07/03/2023</a:t>
+              <a:t>19/02/2024</a:t>
             </a:fld>
             <a:endParaRPr lang="en-GB"/>
           </a:p>
@@ -1739,7 +1745,7 @@
           <a:p>
             <a:fld id="{448139F4-DCF3-46DE-86AD-02E68B534781}" type="datetimeFigureOut">
               <a:rPr lang="en-GB" smtClean="0"/>
-              <a:t>07/03/2023</a:t>
+              <a:t>19/02/2024</a:t>
             </a:fld>
             <a:endParaRPr lang="en-GB"/>
           </a:p>
@@ -1834,7 +1840,7 @@
           <a:p>
             <a:fld id="{448139F4-DCF3-46DE-86AD-02E68B534781}" type="datetimeFigureOut">
               <a:rPr lang="en-GB" smtClean="0"/>
-              <a:t>07/03/2023</a:t>
+              <a:t>19/02/2024</a:t>
             </a:fld>
             <a:endParaRPr lang="en-GB"/>
           </a:p>
@@ -2111,7 +2117,7 @@
           <a:p>
             <a:fld id="{448139F4-DCF3-46DE-86AD-02E68B534781}" type="datetimeFigureOut">
               <a:rPr lang="en-GB" smtClean="0"/>
-              <a:t>07/03/2023</a:t>
+              <a:t>19/02/2024</a:t>
             </a:fld>
             <a:endParaRPr lang="en-GB"/>
           </a:p>
@@ -2364,7 +2370,7 @@
           <a:p>
             <a:fld id="{448139F4-DCF3-46DE-86AD-02E68B534781}" type="datetimeFigureOut">
               <a:rPr lang="en-GB" smtClean="0"/>
-              <a:t>07/03/2023</a:t>
+              <a:t>19/02/2024</a:t>
             </a:fld>
             <a:endParaRPr lang="en-GB"/>
           </a:p>
@@ -2577,7 +2583,7 @@
           <a:p>
             <a:fld id="{448139F4-DCF3-46DE-86AD-02E68B534781}" type="datetimeFigureOut">
               <a:rPr lang="en-GB" smtClean="0"/>
-              <a:t>07/03/2023</a:t>
+              <a:t>19/02/2024</a:t>
             </a:fld>
             <a:endParaRPr lang="en-GB"/>
           </a:p>
@@ -2991,7 +2997,7 @@
         <p:spPr>
           <a:xfrm>
             <a:off x="483476" y="483476"/>
-            <a:ext cx="11414235" cy="3046988"/>
+            <a:ext cx="11414235" cy="5262979"/>
           </a:xfrm>
           <a:prstGeom prst="rect">
             <a:avLst/>
@@ -3038,12 +3044,754 @@
               <a:t>You will eventually give participants online links that allow them to run your study in any browser.</a:t>
             </a:r>
           </a:p>
+          <a:p>
+            <a:endParaRPr lang="en-GB" sz="2400" dirty="0"/>
+          </a:p>
+          <a:p>
+            <a:r>
+              <a:rPr lang="en-GB" sz="2400" dirty="0"/>
+              <a:t>To export your </a:t>
+            </a:r>
+            <a:r>
+              <a:rPr lang="en-GB" sz="2400" dirty="0" err="1"/>
+              <a:t>OpenSesame</a:t>
+            </a:r>
+            <a:r>
+              <a:rPr lang="en-GB" sz="2400" dirty="0"/>
+              <a:t> script to a format that can be used on JATOS, follow the instructions in the following pages:</a:t>
+            </a:r>
+          </a:p>
+          <a:p>
+            <a:pPr marL="342900" indent="-342900">
+              <a:buFontTx/>
+              <a:buChar char="-"/>
+            </a:pPr>
+            <a:r>
+              <a:rPr lang="en-GB" sz="2400" dirty="0"/>
+              <a:t>For </a:t>
+            </a:r>
+            <a:r>
+              <a:rPr lang="en-GB" sz="2400" dirty="0" err="1"/>
+              <a:t>OpenSesame</a:t>
+            </a:r>
+            <a:r>
+              <a:rPr lang="en-GB" sz="2400" dirty="0"/>
+              <a:t> version 3, </a:t>
+            </a:r>
+            <a:r>
+              <a:rPr lang="en-GB" sz="2400" dirty="0">
+                <a:solidFill>
+                  <a:srgbClr val="00B050"/>
+                </a:solidFill>
+              </a:rPr>
+              <a:t>check the instructions on pages 2-6</a:t>
+            </a:r>
+          </a:p>
+          <a:p>
+            <a:pPr marL="342900" indent="-342900">
+              <a:buFontTx/>
+              <a:buChar char="-"/>
+            </a:pPr>
+            <a:r>
+              <a:rPr lang="en-GB" sz="2400" dirty="0"/>
+              <a:t>If you have installed or updated </a:t>
+            </a:r>
+            <a:r>
+              <a:rPr lang="en-GB" sz="2400" dirty="0" err="1"/>
+              <a:t>OpenSesame</a:t>
+            </a:r>
+            <a:r>
+              <a:rPr lang="en-GB" sz="2400" dirty="0"/>
+              <a:t> to version 4, </a:t>
+            </a:r>
+            <a:r>
+              <a:rPr lang="en-GB" sz="2400" dirty="0">
+                <a:solidFill>
+                  <a:srgbClr val="FF0000"/>
+                </a:solidFill>
+              </a:rPr>
+              <a:t>check the instructions on pages 7-12</a:t>
+            </a:r>
+            <a:r>
+              <a:rPr lang="en-GB" sz="2400" dirty="0"/>
+              <a:t> instead</a:t>
+            </a:r>
+          </a:p>
         </p:txBody>
       </p:sp>
     </p:spTree>
     <p:extLst>
       <p:ext uri="{BB962C8B-B14F-4D97-AF65-F5344CB8AC3E}">
         <p14:creationId xmlns:p14="http://schemas.microsoft.com/office/powerpoint/2010/main" val="2606860239"/>
+      </p:ext>
+    </p:extLst>
+  </p:cSld>
+  <p:clrMapOvr>
+    <a:masterClrMapping/>
+  </p:clrMapOvr>
+</p:sld>
+</file>
+
+<file path=ppt/slides/slide10.xml><?xml version="1.0" encoding="utf-8"?>
+<p:sld xmlns:a="http://schemas.openxmlformats.org/drawingml/2006/main" xmlns:r="http://schemas.openxmlformats.org/officeDocument/2006/relationships" xmlns:p="http://schemas.openxmlformats.org/presentationml/2006/main">
+  <p:cSld>
+    <p:spTree>
+      <p:nvGrpSpPr>
+        <p:cNvPr id="1" name=""/>
+        <p:cNvGrpSpPr/>
+        <p:nvPr/>
+      </p:nvGrpSpPr>
+      <p:grpSpPr>
+        <a:xfrm>
+          <a:off x="0" y="0"/>
+          <a:ext cx="0" cy="0"/>
+          <a:chOff x="0" y="0"/>
+          <a:chExt cx="0" cy="0"/>
+        </a:xfrm>
+      </p:grpSpPr>
+      <p:sp>
+        <p:nvSpPr>
+          <p:cNvPr id="4" name="TextBox 3"/>
+          <p:cNvSpPr txBox="1"/>
+          <p:nvPr/>
+        </p:nvSpPr>
+        <p:spPr>
+          <a:xfrm>
+            <a:off x="483476" y="483476"/>
+            <a:ext cx="5524131" cy="1569660"/>
+          </a:xfrm>
+          <a:prstGeom prst="rect">
+            <a:avLst/>
+          </a:prstGeom>
+          <a:noFill/>
+        </p:spPr>
+        <p:txBody>
+          <a:bodyPr wrap="square" rtlCol="0">
+            <a:spAutoFit/>
+          </a:bodyPr>
+          <a:lstStyle/>
+          <a:p>
+            <a:r>
+              <a:rPr lang="en-GB" sz="2400" b="1" dirty="0"/>
+              <a:t>Step 3</a:t>
+            </a:r>
+            <a:r>
+              <a:rPr lang="en-GB" sz="2400" dirty="0"/>
+              <a:t>. Export the Experiment to a .</a:t>
+            </a:r>
+            <a:r>
+              <a:rPr lang="en-GB" sz="2400" dirty="0" err="1"/>
+              <a:t>jzip</a:t>
+            </a:r>
+            <a:r>
+              <a:rPr lang="en-GB" sz="2400" dirty="0"/>
+              <a:t> file</a:t>
+            </a:r>
+          </a:p>
+          <a:p>
+            <a:endParaRPr lang="en-GB" sz="2400" dirty="0"/>
+          </a:p>
+          <a:p>
+            <a:r>
+              <a:rPr lang="en-GB" sz="2400" dirty="0"/>
+              <a:t>Make sure you delete the "0, 1" values in the “possible subject number” field</a:t>
+            </a:r>
+          </a:p>
+        </p:txBody>
+      </p:sp>
+      <p:sp>
+        <p:nvSpPr>
+          <p:cNvPr id="6" name="TextBox 5">
+            <a:extLst>
+              <a:ext uri="{FF2B5EF4-FFF2-40B4-BE49-F238E27FC236}">
+                <a16:creationId xmlns:a16="http://schemas.microsoft.com/office/drawing/2014/main" id="{5A575B33-678C-2956-E88C-5DF3E3D46577}"/>
+              </a:ext>
+            </a:extLst>
+          </p:cNvPr>
+          <p:cNvSpPr txBox="1"/>
+          <p:nvPr/>
+        </p:nvSpPr>
+        <p:spPr>
+          <a:xfrm>
+            <a:off x="10087458" y="160310"/>
+            <a:ext cx="1864659" cy="646331"/>
+          </a:xfrm>
+          <a:prstGeom prst="rect">
+            <a:avLst/>
+          </a:prstGeom>
+          <a:noFill/>
+        </p:spPr>
+        <p:txBody>
+          <a:bodyPr wrap="square">
+            <a:spAutoFit/>
+          </a:bodyPr>
+          <a:lstStyle/>
+          <a:p>
+            <a:pPr algn="r"/>
+            <a:r>
+              <a:rPr lang="en-GB" sz="1800" b="1" dirty="0" err="1">
+                <a:solidFill>
+                  <a:srgbClr val="FF0000"/>
+                </a:solidFill>
+              </a:rPr>
+              <a:t>OpenSesame</a:t>
+            </a:r>
+            <a:endParaRPr lang="en-GB" sz="1800" b="1" dirty="0">
+              <a:solidFill>
+                <a:srgbClr val="FF0000"/>
+              </a:solidFill>
+            </a:endParaRPr>
+          </a:p>
+          <a:p>
+            <a:pPr algn="r"/>
+            <a:r>
+              <a:rPr lang="en-GB" sz="1800" b="1" dirty="0">
+                <a:solidFill>
+                  <a:srgbClr val="FF0000"/>
+                </a:solidFill>
+              </a:rPr>
+              <a:t>version 4.x </a:t>
+            </a:r>
+            <a:endParaRPr lang="en-GB" dirty="0">
+              <a:solidFill>
+                <a:srgbClr val="FF0000"/>
+              </a:solidFill>
+            </a:endParaRPr>
+          </a:p>
+        </p:txBody>
+      </p:sp>
+      <p:pic>
+        <p:nvPicPr>
+          <p:cNvPr id="3" name="Picture 2">
+            <a:extLst>
+              <a:ext uri="{FF2B5EF4-FFF2-40B4-BE49-F238E27FC236}">
+                <a16:creationId xmlns:a16="http://schemas.microsoft.com/office/drawing/2014/main" id="{2DBB70EA-597A-63CA-177A-5956619B488C}"/>
+              </a:ext>
+            </a:extLst>
+          </p:cNvPr>
+          <p:cNvPicPr>
+            <a:picLocks noChangeAspect="1"/>
+          </p:cNvPicPr>
+          <p:nvPr/>
+        </p:nvPicPr>
+        <p:blipFill>
+          <a:blip r:embed="rId2"/>
+          <a:stretch>
+            <a:fillRect/>
+          </a:stretch>
+        </p:blipFill>
+        <p:spPr>
+          <a:xfrm>
+            <a:off x="5778359" y="1407458"/>
+            <a:ext cx="10869994" cy="6158753"/>
+          </a:xfrm>
+          <a:prstGeom prst="rect">
+            <a:avLst/>
+          </a:prstGeom>
+        </p:spPr>
+      </p:pic>
+      <p:cxnSp>
+        <p:nvCxnSpPr>
+          <p:cNvPr id="9" name="Straight Arrow Connector 8">
+            <a:extLst>
+              <a:ext uri="{FF2B5EF4-FFF2-40B4-BE49-F238E27FC236}">
+                <a16:creationId xmlns:a16="http://schemas.microsoft.com/office/drawing/2014/main" id="{9DC96C21-E298-68A9-3492-0867AC4214B5}"/>
+              </a:ext>
+            </a:extLst>
+          </p:cNvPr>
+          <p:cNvCxnSpPr>
+            <a:cxnSpLocks/>
+          </p:cNvCxnSpPr>
+          <p:nvPr/>
+        </p:nvCxnSpPr>
+        <p:spPr>
+          <a:xfrm>
+            <a:off x="5440681" y="2102656"/>
+            <a:ext cx="4581143" cy="1938992"/>
+          </a:xfrm>
+          <a:prstGeom prst="straightConnector1">
+            <a:avLst/>
+          </a:prstGeom>
+          <a:ln w="25400">
+            <a:solidFill>
+              <a:srgbClr val="FF0000"/>
+            </a:solidFill>
+            <a:tailEnd type="triangle"/>
+          </a:ln>
+        </p:spPr>
+        <p:style>
+          <a:lnRef idx="1">
+            <a:schemeClr val="accent1"/>
+          </a:lnRef>
+          <a:fillRef idx="0">
+            <a:schemeClr val="accent1"/>
+          </a:fillRef>
+          <a:effectRef idx="0">
+            <a:schemeClr val="accent1"/>
+          </a:effectRef>
+          <a:fontRef idx="minor">
+            <a:schemeClr val="tx1"/>
+          </a:fontRef>
+        </p:style>
+      </p:cxnSp>
+    </p:spTree>
+    <p:extLst>
+      <p:ext uri="{BB962C8B-B14F-4D97-AF65-F5344CB8AC3E}">
+        <p14:creationId xmlns:p14="http://schemas.microsoft.com/office/powerpoint/2010/main" val="2336554894"/>
+      </p:ext>
+    </p:extLst>
+  </p:cSld>
+  <p:clrMapOvr>
+    <a:masterClrMapping/>
+  </p:clrMapOvr>
+</p:sld>
+</file>
+
+<file path=ppt/slides/slide11.xml><?xml version="1.0" encoding="utf-8"?>
+<p:sld xmlns:a="http://schemas.openxmlformats.org/drawingml/2006/main" xmlns:r="http://schemas.openxmlformats.org/officeDocument/2006/relationships" xmlns:p="http://schemas.openxmlformats.org/presentationml/2006/main">
+  <p:cSld>
+    <p:spTree>
+      <p:nvGrpSpPr>
+        <p:cNvPr id="1" name=""/>
+        <p:cNvGrpSpPr/>
+        <p:nvPr/>
+      </p:nvGrpSpPr>
+      <p:grpSpPr>
+        <a:xfrm>
+          <a:off x="0" y="0"/>
+          <a:ext cx="0" cy="0"/>
+          <a:chOff x="0" y="0"/>
+          <a:chExt cx="0" cy="0"/>
+        </a:xfrm>
+      </p:grpSpPr>
+      <p:sp>
+        <p:nvSpPr>
+          <p:cNvPr id="4" name="TextBox 3"/>
+          <p:cNvSpPr txBox="1"/>
+          <p:nvPr/>
+        </p:nvSpPr>
+        <p:spPr>
+          <a:xfrm>
+            <a:off x="483477" y="483476"/>
+            <a:ext cx="6182499" cy="2308324"/>
+          </a:xfrm>
+          <a:prstGeom prst="rect">
+            <a:avLst/>
+          </a:prstGeom>
+          <a:noFill/>
+        </p:spPr>
+        <p:txBody>
+          <a:bodyPr wrap="square" rtlCol="0">
+            <a:spAutoFit/>
+          </a:bodyPr>
+          <a:lstStyle/>
+          <a:p>
+            <a:r>
+              <a:rPr lang="en-GB" sz="2400" b="1" dirty="0"/>
+              <a:t>Step 4</a:t>
+            </a:r>
+            <a:r>
+              <a:rPr lang="en-GB" sz="2400" dirty="0"/>
+              <a:t>. Export the Experiment to a .</a:t>
+            </a:r>
+            <a:r>
+              <a:rPr lang="en-GB" sz="2400" dirty="0" err="1"/>
+              <a:t>jzip</a:t>
+            </a:r>
+            <a:r>
+              <a:rPr lang="en-GB" sz="2400" dirty="0"/>
+              <a:t> file</a:t>
+            </a:r>
+          </a:p>
+          <a:p>
+            <a:endParaRPr lang="en-GB" sz="2400" dirty="0"/>
+          </a:p>
+          <a:p>
+            <a:r>
+              <a:rPr lang="en-GB" sz="2400" dirty="0"/>
+              <a:t>Click the “Export to JATOS archive” button</a:t>
+            </a:r>
+          </a:p>
+          <a:p>
+            <a:endParaRPr lang="en-GB" sz="2400" dirty="0"/>
+          </a:p>
+          <a:p>
+            <a:r>
+              <a:rPr lang="en-GB" sz="2400" dirty="0"/>
+              <a:t>This will turn your program into a </a:t>
+            </a:r>
+            <a:r>
+              <a:rPr lang="en-GB" sz="2400" dirty="0" err="1"/>
+              <a:t>jzip</a:t>
+            </a:r>
+            <a:r>
+              <a:rPr lang="en-GB" sz="2400" dirty="0"/>
+              <a:t> file (.</a:t>
+            </a:r>
+            <a:r>
+              <a:rPr lang="en-GB" sz="2400" dirty="0" err="1"/>
+              <a:t>jzip</a:t>
+            </a:r>
+            <a:r>
+              <a:rPr lang="en-GB" sz="2400" dirty="0"/>
+              <a:t> extension) – save this file.</a:t>
+            </a:r>
+          </a:p>
+        </p:txBody>
+      </p:sp>
+      <p:sp>
+        <p:nvSpPr>
+          <p:cNvPr id="6" name="TextBox 5">
+            <a:extLst>
+              <a:ext uri="{FF2B5EF4-FFF2-40B4-BE49-F238E27FC236}">
+                <a16:creationId xmlns:a16="http://schemas.microsoft.com/office/drawing/2014/main" id="{CCB781E9-2C01-2032-2D26-60CDF6BB194E}"/>
+              </a:ext>
+            </a:extLst>
+          </p:cNvPr>
+          <p:cNvSpPr txBox="1"/>
+          <p:nvPr/>
+        </p:nvSpPr>
+        <p:spPr>
+          <a:xfrm>
+            <a:off x="10087458" y="160310"/>
+            <a:ext cx="1864659" cy="646331"/>
+          </a:xfrm>
+          <a:prstGeom prst="rect">
+            <a:avLst/>
+          </a:prstGeom>
+          <a:noFill/>
+        </p:spPr>
+        <p:txBody>
+          <a:bodyPr wrap="square">
+            <a:spAutoFit/>
+          </a:bodyPr>
+          <a:lstStyle/>
+          <a:p>
+            <a:pPr algn="r"/>
+            <a:r>
+              <a:rPr lang="en-GB" sz="1800" b="1" dirty="0" err="1">
+                <a:solidFill>
+                  <a:srgbClr val="FF0000"/>
+                </a:solidFill>
+              </a:rPr>
+              <a:t>OpenSesame</a:t>
+            </a:r>
+            <a:endParaRPr lang="en-GB" sz="1800" b="1" dirty="0">
+              <a:solidFill>
+                <a:srgbClr val="FF0000"/>
+              </a:solidFill>
+            </a:endParaRPr>
+          </a:p>
+          <a:p>
+            <a:pPr algn="r"/>
+            <a:r>
+              <a:rPr lang="en-GB" sz="1800" b="1" dirty="0">
+                <a:solidFill>
+                  <a:srgbClr val="FF0000"/>
+                </a:solidFill>
+              </a:rPr>
+              <a:t>version 4.x </a:t>
+            </a:r>
+            <a:endParaRPr lang="en-GB" dirty="0">
+              <a:solidFill>
+                <a:srgbClr val="FF0000"/>
+              </a:solidFill>
+            </a:endParaRPr>
+          </a:p>
+        </p:txBody>
+      </p:sp>
+      <p:pic>
+        <p:nvPicPr>
+          <p:cNvPr id="7" name="Picture 6">
+            <a:extLst>
+              <a:ext uri="{FF2B5EF4-FFF2-40B4-BE49-F238E27FC236}">
+                <a16:creationId xmlns:a16="http://schemas.microsoft.com/office/drawing/2014/main" id="{36B5F629-A1A3-5AC0-2EC6-12D87B3F5250}"/>
+              </a:ext>
+            </a:extLst>
+          </p:cNvPr>
+          <p:cNvPicPr>
+            <a:picLocks noChangeAspect="1"/>
+          </p:cNvPicPr>
+          <p:nvPr/>
+        </p:nvPicPr>
+        <p:blipFill>
+          <a:blip r:embed="rId2"/>
+          <a:stretch>
+            <a:fillRect/>
+          </a:stretch>
+        </p:blipFill>
+        <p:spPr>
+          <a:xfrm>
+            <a:off x="4151312" y="2590632"/>
+            <a:ext cx="10869994" cy="6158753"/>
+          </a:xfrm>
+          <a:prstGeom prst="rect">
+            <a:avLst/>
+          </a:prstGeom>
+        </p:spPr>
+      </p:pic>
+      <p:cxnSp>
+        <p:nvCxnSpPr>
+          <p:cNvPr id="5" name="Straight Arrow Connector 4"/>
+          <p:cNvCxnSpPr>
+            <a:cxnSpLocks/>
+          </p:cNvCxnSpPr>
+          <p:nvPr/>
+        </p:nvCxnSpPr>
+        <p:spPr>
+          <a:xfrm>
+            <a:off x="6096000" y="1537501"/>
+            <a:ext cx="4373880" cy="2934319"/>
+          </a:xfrm>
+          <a:prstGeom prst="straightConnector1">
+            <a:avLst/>
+          </a:prstGeom>
+          <a:ln w="25400">
+            <a:solidFill>
+              <a:srgbClr val="FF0000"/>
+            </a:solidFill>
+            <a:tailEnd type="triangle"/>
+          </a:ln>
+        </p:spPr>
+        <p:style>
+          <a:lnRef idx="1">
+            <a:schemeClr val="accent1"/>
+          </a:lnRef>
+          <a:fillRef idx="0">
+            <a:schemeClr val="accent1"/>
+          </a:fillRef>
+          <a:effectRef idx="0">
+            <a:schemeClr val="accent1"/>
+          </a:effectRef>
+          <a:fontRef idx="minor">
+            <a:schemeClr val="tx1"/>
+          </a:fontRef>
+        </p:style>
+      </p:cxnSp>
+      <p:sp>
+        <p:nvSpPr>
+          <p:cNvPr id="8" name="Oval 7">
+            <a:extLst>
+              <a:ext uri="{FF2B5EF4-FFF2-40B4-BE49-F238E27FC236}">
+                <a16:creationId xmlns:a16="http://schemas.microsoft.com/office/drawing/2014/main" id="{B5861AB2-5ED1-0027-D3DF-B3ED468C3F26}"/>
+              </a:ext>
+            </a:extLst>
+          </p:cNvPr>
+          <p:cNvSpPr/>
+          <p:nvPr/>
+        </p:nvSpPr>
+        <p:spPr>
+          <a:xfrm>
+            <a:off x="10309412" y="4471820"/>
+            <a:ext cx="1882588" cy="206189"/>
+          </a:xfrm>
+          <a:prstGeom prst="ellipse">
+            <a:avLst/>
+          </a:prstGeom>
+          <a:noFill/>
+          <a:ln w="28575">
+            <a:solidFill>
+              <a:srgbClr val="FF0000"/>
+            </a:solidFill>
+          </a:ln>
+        </p:spPr>
+        <p:style>
+          <a:lnRef idx="2">
+            <a:schemeClr val="accent1">
+              <a:shade val="50000"/>
+            </a:schemeClr>
+          </a:lnRef>
+          <a:fillRef idx="1">
+            <a:schemeClr val="accent1"/>
+          </a:fillRef>
+          <a:effectRef idx="0">
+            <a:schemeClr val="accent1"/>
+          </a:effectRef>
+          <a:fontRef idx="minor">
+            <a:schemeClr val="lt1"/>
+          </a:fontRef>
+        </p:style>
+        <p:txBody>
+          <a:bodyPr rtlCol="0" anchor="ctr"/>
+          <a:lstStyle/>
+          <a:p>
+            <a:pPr algn="ctr"/>
+            <a:endParaRPr lang="en-GB"/>
+          </a:p>
+        </p:txBody>
+      </p:sp>
+    </p:spTree>
+    <p:extLst>
+      <p:ext uri="{BB962C8B-B14F-4D97-AF65-F5344CB8AC3E}">
+        <p14:creationId xmlns:p14="http://schemas.microsoft.com/office/powerpoint/2010/main" val="1108996056"/>
+      </p:ext>
+    </p:extLst>
+  </p:cSld>
+  <p:clrMapOvr>
+    <a:masterClrMapping/>
+  </p:clrMapOvr>
+</p:sld>
+</file>
+
+<file path=ppt/slides/slide12.xml><?xml version="1.0" encoding="utf-8"?>
+<p:sld xmlns:a="http://schemas.openxmlformats.org/drawingml/2006/main" xmlns:r="http://schemas.openxmlformats.org/officeDocument/2006/relationships" xmlns:p="http://schemas.openxmlformats.org/presentationml/2006/main">
+  <p:cSld>
+    <p:spTree>
+      <p:nvGrpSpPr>
+        <p:cNvPr id="1" name=""/>
+        <p:cNvGrpSpPr/>
+        <p:nvPr/>
+      </p:nvGrpSpPr>
+      <p:grpSpPr>
+        <a:xfrm>
+          <a:off x="0" y="0"/>
+          <a:ext cx="0" cy="0"/>
+          <a:chOff x="0" y="0"/>
+          <a:chExt cx="0" cy="0"/>
+        </a:xfrm>
+      </p:grpSpPr>
+      <p:sp>
+        <p:nvSpPr>
+          <p:cNvPr id="4" name="TextBox 3"/>
+          <p:cNvSpPr txBox="1"/>
+          <p:nvPr/>
+        </p:nvSpPr>
+        <p:spPr>
+          <a:xfrm>
+            <a:off x="483476" y="1245477"/>
+            <a:ext cx="11414235" cy="2677656"/>
+          </a:xfrm>
+          <a:prstGeom prst="rect">
+            <a:avLst/>
+          </a:prstGeom>
+          <a:noFill/>
+        </p:spPr>
+        <p:txBody>
+          <a:bodyPr wrap="square" rtlCol="0">
+            <a:spAutoFit/>
+          </a:bodyPr>
+          <a:lstStyle/>
+          <a:p>
+            <a:r>
+              <a:rPr lang="en-GB" sz="2400" b="1" dirty="0"/>
+              <a:t>Step 5</a:t>
+            </a:r>
+            <a:r>
+              <a:rPr lang="en-GB" sz="2400" dirty="0"/>
+              <a:t>. The </a:t>
+            </a:r>
+            <a:r>
+              <a:rPr lang="en-GB" sz="2400" dirty="0" err="1"/>
+              <a:t>jzip</a:t>
+            </a:r>
+            <a:r>
+              <a:rPr lang="en-GB" sz="2400" dirty="0"/>
+              <a:t> file that you saved is now ready to be uploaded to the JATOS server.</a:t>
+            </a:r>
+          </a:p>
+          <a:p>
+            <a:endParaRPr lang="en-GB" sz="2400" dirty="0"/>
+          </a:p>
+          <a:p>
+            <a:r>
+              <a:rPr lang="en-GB" sz="2400" dirty="0"/>
+              <a:t>Watch the “Uploading an </a:t>
+            </a:r>
+            <a:r>
+              <a:rPr lang="en-GB" sz="2400" dirty="0" err="1"/>
+              <a:t>OpenSesame</a:t>
+            </a:r>
+            <a:r>
+              <a:rPr lang="en-GB" sz="2400" dirty="0"/>
+              <a:t> Experiment” video on the </a:t>
+            </a:r>
+            <a:r>
+              <a:rPr lang="en-GB" sz="2400" dirty="0">
+                <a:hlinkClick r:id="rId2"/>
+              </a:rPr>
+              <a:t>student resources page </a:t>
+            </a:r>
+            <a:r>
+              <a:rPr lang="en-GB" sz="2400" dirty="0"/>
+              <a:t>for instructions on how to do this.</a:t>
+            </a:r>
+          </a:p>
+          <a:p>
+            <a:endParaRPr lang="en-GB" sz="2400" dirty="0"/>
+          </a:p>
+          <a:p>
+            <a:r>
+              <a:rPr lang="en-GB" sz="2400" dirty="0"/>
+              <a:t>If you have multiple experiment programs (e.g. one for each between-subjects condition in your study) you will do this for each program.</a:t>
+            </a:r>
+          </a:p>
+        </p:txBody>
+      </p:sp>
+      <p:sp>
+        <p:nvSpPr>
+          <p:cNvPr id="3" name="TextBox 2">
+            <a:extLst>
+              <a:ext uri="{FF2B5EF4-FFF2-40B4-BE49-F238E27FC236}">
+                <a16:creationId xmlns:a16="http://schemas.microsoft.com/office/drawing/2014/main" id="{8A067580-7DFF-275F-8CFC-0520ACCBD193}"/>
+              </a:ext>
+            </a:extLst>
+          </p:cNvPr>
+          <p:cNvSpPr txBox="1"/>
+          <p:nvPr/>
+        </p:nvSpPr>
+        <p:spPr>
+          <a:xfrm>
+            <a:off x="10087458" y="160310"/>
+            <a:ext cx="1864659" cy="646331"/>
+          </a:xfrm>
+          <a:prstGeom prst="rect">
+            <a:avLst/>
+          </a:prstGeom>
+          <a:noFill/>
+        </p:spPr>
+        <p:txBody>
+          <a:bodyPr wrap="square">
+            <a:spAutoFit/>
+          </a:bodyPr>
+          <a:lstStyle/>
+          <a:p>
+            <a:pPr algn="r"/>
+            <a:r>
+              <a:rPr lang="en-GB" sz="1800" b="1" dirty="0" err="1">
+                <a:solidFill>
+                  <a:srgbClr val="FF0000"/>
+                </a:solidFill>
+              </a:rPr>
+              <a:t>OpenSesame</a:t>
+            </a:r>
+            <a:endParaRPr lang="en-GB" sz="1800" b="1" dirty="0">
+              <a:solidFill>
+                <a:srgbClr val="FF0000"/>
+              </a:solidFill>
+            </a:endParaRPr>
+          </a:p>
+          <a:p>
+            <a:pPr algn="r"/>
+            <a:r>
+              <a:rPr lang="en-GB" sz="1800" b="1" dirty="0">
+                <a:solidFill>
+                  <a:srgbClr val="FF0000"/>
+                </a:solidFill>
+              </a:rPr>
+              <a:t>version 4.x </a:t>
+            </a:r>
+            <a:endParaRPr lang="en-GB" dirty="0">
+              <a:solidFill>
+                <a:srgbClr val="FF0000"/>
+              </a:solidFill>
+            </a:endParaRPr>
+          </a:p>
+        </p:txBody>
+      </p:sp>
+    </p:spTree>
+    <p:extLst>
+      <p:ext uri="{BB962C8B-B14F-4D97-AF65-F5344CB8AC3E}">
+        <p14:creationId xmlns:p14="http://schemas.microsoft.com/office/powerpoint/2010/main" val="4073188125"/>
       </p:ext>
     </p:extLst>
   </p:cSld>
@@ -3191,6 +3939,67 @@
           </a:fontRef>
         </p:style>
       </p:cxnSp>
+      <p:sp>
+        <p:nvSpPr>
+          <p:cNvPr id="6" name="TextBox 5">
+            <a:extLst>
+              <a:ext uri="{FF2B5EF4-FFF2-40B4-BE49-F238E27FC236}">
+                <a16:creationId xmlns:a16="http://schemas.microsoft.com/office/drawing/2014/main" id="{1B94958E-ED1B-4330-3B04-CBB3601359EE}"/>
+              </a:ext>
+            </a:extLst>
+          </p:cNvPr>
+          <p:cNvSpPr txBox="1"/>
+          <p:nvPr/>
+        </p:nvSpPr>
+        <p:spPr>
+          <a:xfrm>
+            <a:off x="10087458" y="160310"/>
+            <a:ext cx="1864659" cy="646331"/>
+          </a:xfrm>
+          <a:prstGeom prst="rect">
+            <a:avLst/>
+          </a:prstGeom>
+          <a:noFill/>
+        </p:spPr>
+        <p:txBody>
+          <a:bodyPr wrap="square">
+            <a:spAutoFit/>
+          </a:bodyPr>
+          <a:lstStyle/>
+          <a:p>
+            <a:pPr algn="r"/>
+            <a:r>
+              <a:rPr lang="en-GB" sz="1800" b="1" dirty="0" err="1">
+                <a:solidFill>
+                  <a:srgbClr val="00B050"/>
+                </a:solidFill>
+              </a:rPr>
+              <a:t>OpenSesame</a:t>
+            </a:r>
+            <a:endParaRPr lang="en-GB" sz="1800" b="1" dirty="0">
+              <a:solidFill>
+                <a:srgbClr val="00B050"/>
+              </a:solidFill>
+            </a:endParaRPr>
+          </a:p>
+          <a:p>
+            <a:pPr algn="r"/>
+            <a:r>
+              <a:rPr lang="en-GB" sz="1800" b="1" dirty="0">
+                <a:solidFill>
+                  <a:srgbClr val="00B050"/>
+                </a:solidFill>
+              </a:rPr>
+              <a:t>version 3.x </a:t>
+            </a:r>
+            <a:endParaRPr lang="en-GB" dirty="0">
+              <a:solidFill>
+                <a:srgbClr val="00B050"/>
+              </a:solidFill>
+            </a:endParaRPr>
+          </a:p>
+        </p:txBody>
+      </p:sp>
     </p:spTree>
     <p:extLst>
       <p:ext uri="{BB962C8B-B14F-4D97-AF65-F5344CB8AC3E}">
@@ -3370,6 +4179,67 @@
           <a:p>
             <a:pPr algn="ctr"/>
             <a:endParaRPr lang="en-US"/>
+          </a:p>
+        </p:txBody>
+      </p:sp>
+      <p:sp>
+        <p:nvSpPr>
+          <p:cNvPr id="6" name="TextBox 5">
+            <a:extLst>
+              <a:ext uri="{FF2B5EF4-FFF2-40B4-BE49-F238E27FC236}">
+                <a16:creationId xmlns:a16="http://schemas.microsoft.com/office/drawing/2014/main" id="{9EDD86FB-B106-7F18-7F16-7274EF128C7A}"/>
+              </a:ext>
+            </a:extLst>
+          </p:cNvPr>
+          <p:cNvSpPr txBox="1"/>
+          <p:nvPr/>
+        </p:nvSpPr>
+        <p:spPr>
+          <a:xfrm>
+            <a:off x="10087458" y="160310"/>
+            <a:ext cx="1864659" cy="646331"/>
+          </a:xfrm>
+          <a:prstGeom prst="rect">
+            <a:avLst/>
+          </a:prstGeom>
+          <a:noFill/>
+        </p:spPr>
+        <p:txBody>
+          <a:bodyPr wrap="square">
+            <a:spAutoFit/>
+          </a:bodyPr>
+          <a:lstStyle/>
+          <a:p>
+            <a:pPr algn="r"/>
+            <a:r>
+              <a:rPr lang="en-GB" sz="1800" b="1" dirty="0" err="1">
+                <a:solidFill>
+                  <a:srgbClr val="00B050"/>
+                </a:solidFill>
+              </a:rPr>
+              <a:t>OpenSesame</a:t>
+            </a:r>
+            <a:endParaRPr lang="en-GB" sz="1800" b="1" dirty="0">
+              <a:solidFill>
+                <a:srgbClr val="00B050"/>
+              </a:solidFill>
+            </a:endParaRPr>
+          </a:p>
+          <a:p>
+            <a:pPr algn="r"/>
+            <a:r>
+              <a:rPr lang="en-GB" sz="1800" b="1" dirty="0">
+                <a:solidFill>
+                  <a:srgbClr val="00B050"/>
+                </a:solidFill>
+              </a:rPr>
+              <a:t>version 3.x </a:t>
+            </a:r>
+            <a:endParaRPr lang="en-GB" dirty="0">
+              <a:solidFill>
+                <a:srgbClr val="00B050"/>
+              </a:solidFill>
+            </a:endParaRPr>
           </a:p>
         </p:txBody>
       </p:sp>
@@ -3511,6 +4381,67 @@
           </a:fontRef>
         </p:style>
       </p:cxnSp>
+      <p:sp>
+        <p:nvSpPr>
+          <p:cNvPr id="6" name="TextBox 5">
+            <a:extLst>
+              <a:ext uri="{FF2B5EF4-FFF2-40B4-BE49-F238E27FC236}">
+                <a16:creationId xmlns:a16="http://schemas.microsoft.com/office/drawing/2014/main" id="{5A575B33-678C-2956-E88C-5DF3E3D46577}"/>
+              </a:ext>
+            </a:extLst>
+          </p:cNvPr>
+          <p:cNvSpPr txBox="1"/>
+          <p:nvPr/>
+        </p:nvSpPr>
+        <p:spPr>
+          <a:xfrm>
+            <a:off x="10087458" y="160310"/>
+            <a:ext cx="1864659" cy="646331"/>
+          </a:xfrm>
+          <a:prstGeom prst="rect">
+            <a:avLst/>
+          </a:prstGeom>
+          <a:noFill/>
+        </p:spPr>
+        <p:txBody>
+          <a:bodyPr wrap="square">
+            <a:spAutoFit/>
+          </a:bodyPr>
+          <a:lstStyle/>
+          <a:p>
+            <a:pPr algn="r"/>
+            <a:r>
+              <a:rPr lang="en-GB" sz="1800" b="1" dirty="0" err="1">
+                <a:solidFill>
+                  <a:srgbClr val="00B050"/>
+                </a:solidFill>
+              </a:rPr>
+              <a:t>OpenSesame</a:t>
+            </a:r>
+            <a:endParaRPr lang="en-GB" sz="1800" b="1" dirty="0">
+              <a:solidFill>
+                <a:srgbClr val="00B050"/>
+              </a:solidFill>
+            </a:endParaRPr>
+          </a:p>
+          <a:p>
+            <a:pPr algn="r"/>
+            <a:r>
+              <a:rPr lang="en-GB" sz="1800" b="1" dirty="0">
+                <a:solidFill>
+                  <a:srgbClr val="00B050"/>
+                </a:solidFill>
+              </a:rPr>
+              <a:t>version 3.x </a:t>
+            </a:r>
+            <a:endParaRPr lang="en-GB" dirty="0">
+              <a:solidFill>
+                <a:srgbClr val="00B050"/>
+              </a:solidFill>
+            </a:endParaRPr>
+          </a:p>
+        </p:txBody>
+      </p:sp>
     </p:spTree>
     <p:extLst>
       <p:ext uri="{BB962C8B-B14F-4D97-AF65-F5344CB8AC3E}">
@@ -3649,6 +4580,67 @@
           </a:fontRef>
         </p:style>
       </p:cxnSp>
+      <p:sp>
+        <p:nvSpPr>
+          <p:cNvPr id="6" name="TextBox 5">
+            <a:extLst>
+              <a:ext uri="{FF2B5EF4-FFF2-40B4-BE49-F238E27FC236}">
+                <a16:creationId xmlns:a16="http://schemas.microsoft.com/office/drawing/2014/main" id="{CCB781E9-2C01-2032-2D26-60CDF6BB194E}"/>
+              </a:ext>
+            </a:extLst>
+          </p:cNvPr>
+          <p:cNvSpPr txBox="1"/>
+          <p:nvPr/>
+        </p:nvSpPr>
+        <p:spPr>
+          <a:xfrm>
+            <a:off x="10087458" y="160310"/>
+            <a:ext cx="1864659" cy="646331"/>
+          </a:xfrm>
+          <a:prstGeom prst="rect">
+            <a:avLst/>
+          </a:prstGeom>
+          <a:noFill/>
+        </p:spPr>
+        <p:txBody>
+          <a:bodyPr wrap="square">
+            <a:spAutoFit/>
+          </a:bodyPr>
+          <a:lstStyle/>
+          <a:p>
+            <a:pPr algn="r"/>
+            <a:r>
+              <a:rPr lang="en-GB" sz="1800" b="1" dirty="0" err="1">
+                <a:solidFill>
+                  <a:srgbClr val="00B050"/>
+                </a:solidFill>
+              </a:rPr>
+              <a:t>OpenSesame</a:t>
+            </a:r>
+            <a:endParaRPr lang="en-GB" sz="1800" b="1" dirty="0">
+              <a:solidFill>
+                <a:srgbClr val="00B050"/>
+              </a:solidFill>
+            </a:endParaRPr>
+          </a:p>
+          <a:p>
+            <a:pPr algn="r"/>
+            <a:r>
+              <a:rPr lang="en-GB" sz="1800" b="1" dirty="0">
+                <a:solidFill>
+                  <a:srgbClr val="00B050"/>
+                </a:solidFill>
+              </a:rPr>
+              <a:t>version 3.x </a:t>
+            </a:r>
+            <a:endParaRPr lang="en-GB" dirty="0">
+              <a:solidFill>
+                <a:srgbClr val="00B050"/>
+              </a:solidFill>
+            </a:endParaRPr>
+          </a:p>
+        </p:txBody>
+      </p:sp>
     </p:spTree>
     <p:extLst>
       <p:ext uri="{BB962C8B-B14F-4D97-AF65-F5344CB8AC3E}">
@@ -3687,7 +4679,7 @@
         </p:nvSpPr>
         <p:spPr>
           <a:xfrm>
-            <a:off x="483476" y="483476"/>
+            <a:off x="483476" y="1245477"/>
             <a:ext cx="11414235" cy="2677656"/>
           </a:xfrm>
           <a:prstGeom prst="rect">
@@ -3748,10 +4740,752 @@
           </a:p>
         </p:txBody>
       </p:sp>
+      <p:sp>
+        <p:nvSpPr>
+          <p:cNvPr id="3" name="TextBox 2">
+            <a:extLst>
+              <a:ext uri="{FF2B5EF4-FFF2-40B4-BE49-F238E27FC236}">
+                <a16:creationId xmlns:a16="http://schemas.microsoft.com/office/drawing/2014/main" id="{8A067580-7DFF-275F-8CFC-0520ACCBD193}"/>
+              </a:ext>
+            </a:extLst>
+          </p:cNvPr>
+          <p:cNvSpPr txBox="1"/>
+          <p:nvPr/>
+        </p:nvSpPr>
+        <p:spPr>
+          <a:xfrm>
+            <a:off x="10087458" y="160310"/>
+            <a:ext cx="1864659" cy="646331"/>
+          </a:xfrm>
+          <a:prstGeom prst="rect">
+            <a:avLst/>
+          </a:prstGeom>
+          <a:noFill/>
+        </p:spPr>
+        <p:txBody>
+          <a:bodyPr wrap="square">
+            <a:spAutoFit/>
+          </a:bodyPr>
+          <a:lstStyle/>
+          <a:p>
+            <a:pPr algn="r"/>
+            <a:r>
+              <a:rPr lang="en-GB" sz="1800" b="1" dirty="0" err="1">
+                <a:solidFill>
+                  <a:srgbClr val="00B050"/>
+                </a:solidFill>
+              </a:rPr>
+              <a:t>OpenSesame</a:t>
+            </a:r>
+            <a:endParaRPr lang="en-GB" sz="1800" b="1" dirty="0">
+              <a:solidFill>
+                <a:srgbClr val="00B050"/>
+              </a:solidFill>
+            </a:endParaRPr>
+          </a:p>
+          <a:p>
+            <a:pPr algn="r"/>
+            <a:r>
+              <a:rPr lang="en-GB" sz="1800" b="1" dirty="0">
+                <a:solidFill>
+                  <a:srgbClr val="00B050"/>
+                </a:solidFill>
+              </a:rPr>
+              <a:t>version 3.x </a:t>
+            </a:r>
+            <a:endParaRPr lang="en-GB" dirty="0">
+              <a:solidFill>
+                <a:srgbClr val="00B050"/>
+              </a:solidFill>
+            </a:endParaRPr>
+          </a:p>
+        </p:txBody>
+      </p:sp>
     </p:spTree>
     <p:extLst>
       <p:ext uri="{BB962C8B-B14F-4D97-AF65-F5344CB8AC3E}">
         <p14:creationId xmlns:p14="http://schemas.microsoft.com/office/powerpoint/2010/main" val="2320175702"/>
+      </p:ext>
+    </p:extLst>
+  </p:cSld>
+  <p:clrMapOvr>
+    <a:masterClrMapping/>
+  </p:clrMapOvr>
+</p:sld>
+</file>
+
+<file path=ppt/slides/slide7.xml><?xml version="1.0" encoding="utf-8"?>
+<p:sld xmlns:a="http://schemas.openxmlformats.org/drawingml/2006/main" xmlns:r="http://schemas.openxmlformats.org/officeDocument/2006/relationships" xmlns:p="http://schemas.openxmlformats.org/presentationml/2006/main">
+  <p:cSld>
+    <p:spTree>
+      <p:nvGrpSpPr>
+        <p:cNvPr id="1" name=""/>
+        <p:cNvGrpSpPr/>
+        <p:nvPr/>
+      </p:nvGrpSpPr>
+      <p:grpSpPr>
+        <a:xfrm>
+          <a:off x="0" y="0"/>
+          <a:ext cx="0" cy="0"/>
+          <a:chOff x="0" y="0"/>
+          <a:chExt cx="0" cy="0"/>
+        </a:xfrm>
+      </p:grpSpPr>
+      <p:sp>
+        <p:nvSpPr>
+          <p:cNvPr id="4" name="TextBox 3"/>
+          <p:cNvSpPr txBox="1"/>
+          <p:nvPr/>
+        </p:nvSpPr>
+        <p:spPr>
+          <a:xfrm>
+            <a:off x="483476" y="1245477"/>
+            <a:ext cx="11414235" cy="830997"/>
+          </a:xfrm>
+          <a:prstGeom prst="rect">
+            <a:avLst/>
+          </a:prstGeom>
+          <a:noFill/>
+        </p:spPr>
+        <p:txBody>
+          <a:bodyPr wrap="square" rtlCol="0">
+            <a:spAutoFit/>
+          </a:bodyPr>
+          <a:lstStyle/>
+          <a:p>
+            <a:r>
+              <a:rPr lang="en-GB" sz="2400" dirty="0"/>
+              <a:t>Follow the instructions on pages 8-12 only if you have installed or updated </a:t>
+            </a:r>
+            <a:r>
+              <a:rPr lang="en-GB" sz="2400" dirty="0" err="1"/>
+              <a:t>OpenSesame</a:t>
+            </a:r>
+            <a:r>
+              <a:rPr lang="en-GB" sz="2400" dirty="0"/>
+              <a:t> to version 4</a:t>
+            </a:r>
+            <a:endParaRPr lang="en-GB" sz="2400" dirty="0">
+              <a:solidFill>
+                <a:srgbClr val="FF0000"/>
+              </a:solidFill>
+            </a:endParaRPr>
+          </a:p>
+        </p:txBody>
+      </p:sp>
+      <p:sp>
+        <p:nvSpPr>
+          <p:cNvPr id="5" name="TextBox 4">
+            <a:extLst>
+              <a:ext uri="{FF2B5EF4-FFF2-40B4-BE49-F238E27FC236}">
+                <a16:creationId xmlns:a16="http://schemas.microsoft.com/office/drawing/2014/main" id="{CFDDA3FE-C325-4CDC-41D8-DC33D46DF5E7}"/>
+              </a:ext>
+            </a:extLst>
+          </p:cNvPr>
+          <p:cNvSpPr txBox="1"/>
+          <p:nvPr/>
+        </p:nvSpPr>
+        <p:spPr>
+          <a:xfrm>
+            <a:off x="10087458" y="160310"/>
+            <a:ext cx="1864659" cy="646331"/>
+          </a:xfrm>
+          <a:prstGeom prst="rect">
+            <a:avLst/>
+          </a:prstGeom>
+          <a:noFill/>
+        </p:spPr>
+        <p:txBody>
+          <a:bodyPr wrap="square">
+            <a:spAutoFit/>
+          </a:bodyPr>
+          <a:lstStyle/>
+          <a:p>
+            <a:pPr algn="r"/>
+            <a:r>
+              <a:rPr lang="en-GB" sz="1800" b="1" dirty="0" err="1">
+                <a:solidFill>
+                  <a:srgbClr val="FF0000"/>
+                </a:solidFill>
+              </a:rPr>
+              <a:t>OpenSesame</a:t>
+            </a:r>
+            <a:endParaRPr lang="en-GB" sz="1800" b="1" dirty="0">
+              <a:solidFill>
+                <a:srgbClr val="FF0000"/>
+              </a:solidFill>
+            </a:endParaRPr>
+          </a:p>
+          <a:p>
+            <a:pPr algn="r"/>
+            <a:r>
+              <a:rPr lang="en-GB" sz="1800" b="1" dirty="0">
+                <a:solidFill>
+                  <a:srgbClr val="FF0000"/>
+                </a:solidFill>
+              </a:rPr>
+              <a:t>version 4.x </a:t>
+            </a:r>
+            <a:endParaRPr lang="en-GB" dirty="0">
+              <a:solidFill>
+                <a:srgbClr val="FF0000"/>
+              </a:solidFill>
+            </a:endParaRPr>
+          </a:p>
+        </p:txBody>
+      </p:sp>
+    </p:spTree>
+    <p:extLst>
+      <p:ext uri="{BB962C8B-B14F-4D97-AF65-F5344CB8AC3E}">
+        <p14:creationId xmlns:p14="http://schemas.microsoft.com/office/powerpoint/2010/main" val="1711297143"/>
+      </p:ext>
+    </p:extLst>
+  </p:cSld>
+  <p:clrMapOvr>
+    <a:masterClrMapping/>
+  </p:clrMapOvr>
+</p:sld>
+</file>
+
+<file path=ppt/slides/slide8.xml><?xml version="1.0" encoding="utf-8"?>
+<p:sld xmlns:a="http://schemas.openxmlformats.org/drawingml/2006/main" xmlns:r="http://schemas.openxmlformats.org/officeDocument/2006/relationships" xmlns:p="http://schemas.openxmlformats.org/presentationml/2006/main">
+  <p:cSld>
+    <p:spTree>
+      <p:nvGrpSpPr>
+        <p:cNvPr id="1" name=""/>
+        <p:cNvGrpSpPr/>
+        <p:nvPr/>
+      </p:nvGrpSpPr>
+      <p:grpSpPr>
+        <a:xfrm>
+          <a:off x="0" y="0"/>
+          <a:ext cx="0" cy="0"/>
+          <a:chOff x="0" y="0"/>
+          <a:chExt cx="0" cy="0"/>
+        </a:xfrm>
+      </p:grpSpPr>
+      <p:sp>
+        <p:nvSpPr>
+          <p:cNvPr id="4" name="TextBox 3"/>
+          <p:cNvSpPr txBox="1"/>
+          <p:nvPr/>
+        </p:nvSpPr>
+        <p:spPr>
+          <a:xfrm>
+            <a:off x="483477" y="483476"/>
+            <a:ext cx="5222380" cy="6801862"/>
+          </a:xfrm>
+          <a:prstGeom prst="rect">
+            <a:avLst/>
+          </a:prstGeom>
+          <a:noFill/>
+        </p:spPr>
+        <p:txBody>
+          <a:bodyPr wrap="square" rtlCol="0">
+            <a:spAutoFit/>
+          </a:bodyPr>
+          <a:lstStyle/>
+          <a:p>
+            <a:r>
+              <a:rPr lang="en-GB" sz="2400" b="1" dirty="0"/>
+              <a:t>Step 1</a:t>
+            </a:r>
+            <a:r>
+              <a:rPr lang="en-GB" sz="2400" dirty="0"/>
+              <a:t>. Test your program to see if it’s compatible with running online.</a:t>
+            </a:r>
+          </a:p>
+          <a:p>
+            <a:endParaRPr lang="en-GB" sz="2400" dirty="0"/>
+          </a:p>
+          <a:p>
+            <a:pPr marL="342900" indent="-342900">
+              <a:buFont typeface="Arial" panose="020B0604020202020204" pitchFamily="34" charset="0"/>
+              <a:buChar char="•"/>
+            </a:pPr>
+            <a:r>
+              <a:rPr lang="en-GB" sz="2400" dirty="0"/>
+              <a:t>In the experiment properties, check “in a browser with </a:t>
+            </a:r>
+            <a:r>
+              <a:rPr lang="en-GB" sz="2400" dirty="0" err="1"/>
+              <a:t>OSweb</a:t>
+            </a:r>
+            <a:r>
+              <a:rPr lang="en-GB" sz="2400" dirty="0"/>
+              <a:t>” </a:t>
+            </a:r>
+          </a:p>
+          <a:p>
+            <a:pPr marL="342900" indent="-342900">
+              <a:buFont typeface="Arial" panose="020B0604020202020204" pitchFamily="34" charset="0"/>
+              <a:buChar char="•"/>
+            </a:pPr>
+            <a:endParaRPr lang="en-GB" sz="2400" dirty="0"/>
+          </a:p>
+          <a:p>
+            <a:pPr marL="342900" indent="-342900">
+              <a:buFont typeface="Arial" panose="020B0604020202020204" pitchFamily="34" charset="0"/>
+              <a:buChar char="•"/>
+            </a:pPr>
+            <a:r>
+              <a:rPr lang="en-GB" sz="2400" dirty="0"/>
+              <a:t>Run your experiment as usual. It should open in a browser window (we recommend Google Chrome).</a:t>
+            </a:r>
+          </a:p>
+          <a:p>
+            <a:pPr marL="342900" indent="-342900">
+              <a:buFont typeface="Arial" panose="020B0604020202020204" pitchFamily="34" charset="0"/>
+              <a:buChar char="•"/>
+            </a:pPr>
+            <a:endParaRPr lang="en-GB" sz="2400" dirty="0"/>
+          </a:p>
+          <a:p>
+            <a:pPr marL="342900" indent="-342900">
+              <a:buFont typeface="Arial" panose="020B0604020202020204" pitchFamily="34" charset="0"/>
+              <a:buChar char="•"/>
+            </a:pPr>
+            <a:r>
+              <a:rPr lang="en-GB" sz="2400" dirty="0"/>
+              <a:t>If it doesn’t run properly in the browser view, it won’t run online!</a:t>
+            </a:r>
+          </a:p>
+          <a:p>
+            <a:pPr marL="342900" indent="-342900">
+              <a:buFont typeface="Arial" panose="020B0604020202020204" pitchFamily="34" charset="0"/>
+              <a:buChar char="•"/>
+            </a:pPr>
+            <a:endParaRPr lang="en-GB" sz="2400" dirty="0"/>
+          </a:p>
+          <a:p>
+            <a:pPr marL="342900" indent="-342900">
+              <a:buFont typeface="Arial" panose="020B0604020202020204" pitchFamily="34" charset="0"/>
+              <a:buChar char="•"/>
+            </a:pPr>
+            <a:r>
+              <a:rPr lang="en-GB" sz="2000" dirty="0"/>
+              <a:t>Once you have tested that your experiment works as expected in a browser, remember put this setting back to “On the desktop with </a:t>
+            </a:r>
+            <a:r>
+              <a:rPr lang="en-GB" sz="2000" dirty="0" err="1"/>
+              <a:t>Expyriment</a:t>
+            </a:r>
+            <a:r>
+              <a:rPr lang="en-GB" sz="2000" dirty="0"/>
+              <a:t>” if you want to test your experiment further on your laptop</a:t>
+            </a:r>
+          </a:p>
+          <a:p>
+            <a:endParaRPr lang="en-GB" sz="2400" dirty="0"/>
+          </a:p>
+        </p:txBody>
+      </p:sp>
+      <p:sp>
+        <p:nvSpPr>
+          <p:cNvPr id="6" name="TextBox 5">
+            <a:extLst>
+              <a:ext uri="{FF2B5EF4-FFF2-40B4-BE49-F238E27FC236}">
+                <a16:creationId xmlns:a16="http://schemas.microsoft.com/office/drawing/2014/main" id="{1B94958E-ED1B-4330-3B04-CBB3601359EE}"/>
+              </a:ext>
+            </a:extLst>
+          </p:cNvPr>
+          <p:cNvSpPr txBox="1"/>
+          <p:nvPr/>
+        </p:nvSpPr>
+        <p:spPr>
+          <a:xfrm>
+            <a:off x="10087458" y="160310"/>
+            <a:ext cx="1864659" cy="646331"/>
+          </a:xfrm>
+          <a:prstGeom prst="rect">
+            <a:avLst/>
+          </a:prstGeom>
+          <a:noFill/>
+        </p:spPr>
+        <p:txBody>
+          <a:bodyPr wrap="square">
+            <a:spAutoFit/>
+          </a:bodyPr>
+          <a:lstStyle/>
+          <a:p>
+            <a:pPr algn="r"/>
+            <a:r>
+              <a:rPr lang="en-GB" sz="1800" b="1" dirty="0" err="1">
+                <a:solidFill>
+                  <a:srgbClr val="FF0000"/>
+                </a:solidFill>
+              </a:rPr>
+              <a:t>OpenSesame</a:t>
+            </a:r>
+            <a:endParaRPr lang="en-GB" sz="1800" b="1" dirty="0">
+              <a:solidFill>
+                <a:srgbClr val="FF0000"/>
+              </a:solidFill>
+            </a:endParaRPr>
+          </a:p>
+          <a:p>
+            <a:pPr algn="r"/>
+            <a:r>
+              <a:rPr lang="en-GB" sz="1800" b="1" dirty="0">
+                <a:solidFill>
+                  <a:srgbClr val="FF0000"/>
+                </a:solidFill>
+              </a:rPr>
+              <a:t>version 4.x </a:t>
+            </a:r>
+            <a:endParaRPr lang="en-GB" dirty="0">
+              <a:solidFill>
+                <a:srgbClr val="FF0000"/>
+              </a:solidFill>
+            </a:endParaRPr>
+          </a:p>
+        </p:txBody>
+      </p:sp>
+      <p:grpSp>
+        <p:nvGrpSpPr>
+          <p:cNvPr id="11" name="Group 10">
+            <a:extLst>
+              <a:ext uri="{FF2B5EF4-FFF2-40B4-BE49-F238E27FC236}">
+                <a16:creationId xmlns:a16="http://schemas.microsoft.com/office/drawing/2014/main" id="{272F0B7F-952D-4B90-E1B0-5F845E4969B3}"/>
+              </a:ext>
+            </a:extLst>
+          </p:cNvPr>
+          <p:cNvGrpSpPr/>
+          <p:nvPr/>
+        </p:nvGrpSpPr>
+        <p:grpSpPr>
+          <a:xfrm>
+            <a:off x="5872958" y="1145923"/>
+            <a:ext cx="9420713" cy="5712077"/>
+            <a:chOff x="4446494" y="1683805"/>
+            <a:chExt cx="9420713" cy="5712077"/>
+          </a:xfrm>
+        </p:grpSpPr>
+        <p:pic>
+          <p:nvPicPr>
+            <p:cNvPr id="7" name="Picture 6">
+              <a:extLst>
+                <a:ext uri="{FF2B5EF4-FFF2-40B4-BE49-F238E27FC236}">
+                  <a16:creationId xmlns:a16="http://schemas.microsoft.com/office/drawing/2014/main" id="{3CA11AE4-5B97-037C-7E0F-EA30AE1B6C6F}"/>
+                </a:ext>
+              </a:extLst>
+            </p:cNvPr>
+            <p:cNvPicPr>
+              <a:picLocks noChangeAspect="1"/>
+            </p:cNvPicPr>
+            <p:nvPr/>
+          </p:nvPicPr>
+          <p:blipFill>
+            <a:blip r:embed="rId2"/>
+            <a:stretch>
+              <a:fillRect/>
+            </a:stretch>
+          </p:blipFill>
+          <p:spPr>
+            <a:xfrm>
+              <a:off x="4446494" y="1683805"/>
+              <a:ext cx="9420713" cy="5712077"/>
+            </a:xfrm>
+            <a:prstGeom prst="rect">
+              <a:avLst/>
+            </a:prstGeom>
+          </p:spPr>
+        </p:pic>
+        <p:sp>
+          <p:nvSpPr>
+            <p:cNvPr id="10" name="Oval 9">
+              <a:extLst>
+                <a:ext uri="{FF2B5EF4-FFF2-40B4-BE49-F238E27FC236}">
+                  <a16:creationId xmlns:a16="http://schemas.microsoft.com/office/drawing/2014/main" id="{B1A70E01-C885-C294-4EC9-3A49058FD91B}"/>
+                </a:ext>
+              </a:extLst>
+            </p:cNvPr>
+            <p:cNvSpPr/>
+            <p:nvPr/>
+          </p:nvSpPr>
+          <p:spPr>
+            <a:xfrm>
+              <a:off x="7826189" y="3612776"/>
+              <a:ext cx="1882588" cy="206189"/>
+            </a:xfrm>
+            <a:prstGeom prst="ellipse">
+              <a:avLst/>
+            </a:prstGeom>
+            <a:noFill/>
+            <a:ln w="28575">
+              <a:solidFill>
+                <a:srgbClr val="FF0000"/>
+              </a:solidFill>
+            </a:ln>
+          </p:spPr>
+          <p:style>
+            <a:lnRef idx="2">
+              <a:schemeClr val="accent1">
+                <a:shade val="50000"/>
+              </a:schemeClr>
+            </a:lnRef>
+            <a:fillRef idx="1">
+              <a:schemeClr val="accent1"/>
+            </a:fillRef>
+            <a:effectRef idx="0">
+              <a:schemeClr val="accent1"/>
+            </a:effectRef>
+            <a:fontRef idx="minor">
+              <a:schemeClr val="lt1"/>
+            </a:fontRef>
+          </p:style>
+          <p:txBody>
+            <a:bodyPr rtlCol="0" anchor="ctr"/>
+            <a:lstStyle/>
+            <a:p>
+              <a:pPr algn="ctr"/>
+              <a:endParaRPr lang="en-GB"/>
+            </a:p>
+          </p:txBody>
+        </p:sp>
+      </p:grpSp>
+    </p:spTree>
+    <p:extLst>
+      <p:ext uri="{BB962C8B-B14F-4D97-AF65-F5344CB8AC3E}">
+        <p14:creationId xmlns:p14="http://schemas.microsoft.com/office/powerpoint/2010/main" val="206804350"/>
+      </p:ext>
+    </p:extLst>
+  </p:cSld>
+  <p:clrMapOvr>
+    <a:masterClrMapping/>
+  </p:clrMapOvr>
+</p:sld>
+</file>
+
+<file path=ppt/slides/slide9.xml><?xml version="1.0" encoding="utf-8"?>
+<p:sld xmlns:a="http://schemas.openxmlformats.org/drawingml/2006/main" xmlns:r="http://schemas.openxmlformats.org/officeDocument/2006/relationships" xmlns:p="http://schemas.openxmlformats.org/presentationml/2006/main">
+  <p:cSld>
+    <p:spTree>
+      <p:nvGrpSpPr>
+        <p:cNvPr id="1" name=""/>
+        <p:cNvGrpSpPr/>
+        <p:nvPr/>
+      </p:nvGrpSpPr>
+      <p:grpSpPr>
+        <a:xfrm>
+          <a:off x="0" y="0"/>
+          <a:ext cx="0" cy="0"/>
+          <a:chOff x="0" y="0"/>
+          <a:chExt cx="0" cy="0"/>
+        </a:xfrm>
+      </p:grpSpPr>
+      <p:sp>
+        <p:nvSpPr>
+          <p:cNvPr id="4" name="TextBox 3"/>
+          <p:cNvSpPr txBox="1"/>
+          <p:nvPr/>
+        </p:nvSpPr>
+        <p:spPr>
+          <a:xfrm>
+            <a:off x="483476" y="483476"/>
+            <a:ext cx="5743587" cy="1569660"/>
+          </a:xfrm>
+          <a:prstGeom prst="rect">
+            <a:avLst/>
+          </a:prstGeom>
+          <a:noFill/>
+        </p:spPr>
+        <p:txBody>
+          <a:bodyPr wrap="square" rtlCol="0">
+            <a:spAutoFit/>
+          </a:bodyPr>
+          <a:lstStyle/>
+          <a:p>
+            <a:r>
+              <a:rPr lang="en-GB" sz="2400" b="1" dirty="0"/>
+              <a:t>Step 2</a:t>
+            </a:r>
+            <a:r>
+              <a:rPr lang="en-GB" sz="2400" dirty="0"/>
+              <a:t>. Export the Experiment to a .</a:t>
+            </a:r>
+            <a:r>
+              <a:rPr lang="en-GB" sz="2400" dirty="0" err="1"/>
+              <a:t>jzip</a:t>
+            </a:r>
+            <a:r>
+              <a:rPr lang="en-GB" sz="2400" dirty="0"/>
+              <a:t> file</a:t>
+            </a:r>
+          </a:p>
+          <a:p>
+            <a:endParaRPr lang="en-GB" sz="2400" dirty="0"/>
+          </a:p>
+          <a:p>
+            <a:r>
+              <a:rPr lang="en-GB" sz="2400" dirty="0"/>
+              <a:t>Open the “</a:t>
+            </a:r>
+            <a:r>
+              <a:rPr lang="en-GB" sz="2400" dirty="0" err="1"/>
+              <a:t>OSWeb</a:t>
+            </a:r>
+            <a:r>
+              <a:rPr lang="en-GB" sz="2400" dirty="0"/>
+              <a:t> and JATOS control” panel from the “Tools” menu</a:t>
+            </a:r>
+          </a:p>
+        </p:txBody>
+      </p:sp>
+      <p:sp>
+        <p:nvSpPr>
+          <p:cNvPr id="6" name="TextBox 5">
+            <a:extLst>
+              <a:ext uri="{FF2B5EF4-FFF2-40B4-BE49-F238E27FC236}">
+                <a16:creationId xmlns:a16="http://schemas.microsoft.com/office/drawing/2014/main" id="{5A575B33-678C-2956-E88C-5DF3E3D46577}"/>
+              </a:ext>
+            </a:extLst>
+          </p:cNvPr>
+          <p:cNvSpPr txBox="1"/>
+          <p:nvPr/>
+        </p:nvSpPr>
+        <p:spPr>
+          <a:xfrm>
+            <a:off x="10087458" y="160310"/>
+            <a:ext cx="1864659" cy="646331"/>
+          </a:xfrm>
+          <a:prstGeom prst="rect">
+            <a:avLst/>
+          </a:prstGeom>
+          <a:noFill/>
+        </p:spPr>
+        <p:txBody>
+          <a:bodyPr wrap="square">
+            <a:spAutoFit/>
+          </a:bodyPr>
+          <a:lstStyle/>
+          <a:p>
+            <a:pPr algn="r"/>
+            <a:r>
+              <a:rPr lang="en-GB" sz="1800" b="1" dirty="0" err="1">
+                <a:solidFill>
+                  <a:srgbClr val="FF0000"/>
+                </a:solidFill>
+              </a:rPr>
+              <a:t>OpenSesame</a:t>
+            </a:r>
+            <a:endParaRPr lang="en-GB" sz="1800" b="1" dirty="0">
+              <a:solidFill>
+                <a:srgbClr val="FF0000"/>
+              </a:solidFill>
+            </a:endParaRPr>
+          </a:p>
+          <a:p>
+            <a:pPr algn="r"/>
+            <a:r>
+              <a:rPr lang="en-GB" sz="1800" b="1" dirty="0">
+                <a:solidFill>
+                  <a:srgbClr val="FF0000"/>
+                </a:solidFill>
+              </a:rPr>
+              <a:t>version 4.x </a:t>
+            </a:r>
+            <a:endParaRPr lang="en-GB" dirty="0">
+              <a:solidFill>
+                <a:srgbClr val="FF0000"/>
+              </a:solidFill>
+            </a:endParaRPr>
+          </a:p>
+        </p:txBody>
+      </p:sp>
+      <p:grpSp>
+        <p:nvGrpSpPr>
+          <p:cNvPr id="10" name="Group 9">
+            <a:extLst>
+              <a:ext uri="{FF2B5EF4-FFF2-40B4-BE49-F238E27FC236}">
+                <a16:creationId xmlns:a16="http://schemas.microsoft.com/office/drawing/2014/main" id="{3F285B7D-9C60-3DE2-FCA6-98EA14DFB72E}"/>
+              </a:ext>
+            </a:extLst>
+          </p:cNvPr>
+          <p:cNvGrpSpPr/>
+          <p:nvPr/>
+        </p:nvGrpSpPr>
+        <p:grpSpPr>
+          <a:xfrm>
+            <a:off x="6326815" y="1083991"/>
+            <a:ext cx="9385943" cy="5522259"/>
+            <a:chOff x="5649379" y="1175431"/>
+            <a:chExt cx="9385943" cy="5522259"/>
+          </a:xfrm>
+        </p:grpSpPr>
+        <p:pic>
+          <p:nvPicPr>
+            <p:cNvPr id="7" name="Picture 6">
+              <a:extLst>
+                <a:ext uri="{FF2B5EF4-FFF2-40B4-BE49-F238E27FC236}">
+                  <a16:creationId xmlns:a16="http://schemas.microsoft.com/office/drawing/2014/main" id="{0FC1DB6D-5751-1222-840C-31D811623F98}"/>
+                </a:ext>
+              </a:extLst>
+            </p:cNvPr>
+            <p:cNvPicPr>
+              <a:picLocks noChangeAspect="1"/>
+            </p:cNvPicPr>
+            <p:nvPr/>
+          </p:nvPicPr>
+          <p:blipFill>
+            <a:blip r:embed="rId2"/>
+            <a:stretch>
+              <a:fillRect/>
+            </a:stretch>
+          </p:blipFill>
+          <p:spPr>
+            <a:xfrm>
+              <a:off x="5865216" y="1175431"/>
+              <a:ext cx="9170106" cy="5522259"/>
+            </a:xfrm>
+            <a:prstGeom prst="rect">
+              <a:avLst/>
+            </a:prstGeom>
+          </p:spPr>
+        </p:pic>
+        <p:cxnSp>
+          <p:nvCxnSpPr>
+            <p:cNvPr id="5" name="Straight Arrow Connector 4"/>
+            <p:cNvCxnSpPr>
+              <a:cxnSpLocks/>
+            </p:cNvCxnSpPr>
+            <p:nvPr/>
+          </p:nvCxnSpPr>
+          <p:spPr>
+            <a:xfrm>
+              <a:off x="5649379" y="1609344"/>
+              <a:ext cx="1168722" cy="514146"/>
+            </a:xfrm>
+            <a:prstGeom prst="straightConnector1">
+              <a:avLst/>
+            </a:prstGeom>
+            <a:ln w="25400">
+              <a:solidFill>
+                <a:srgbClr val="FF0000"/>
+              </a:solidFill>
+              <a:tailEnd type="triangle"/>
+            </a:ln>
+          </p:spPr>
+          <p:style>
+            <a:lnRef idx="1">
+              <a:schemeClr val="accent1"/>
+            </a:lnRef>
+            <a:fillRef idx="0">
+              <a:schemeClr val="accent1"/>
+            </a:fillRef>
+            <a:effectRef idx="0">
+              <a:schemeClr val="accent1"/>
+            </a:effectRef>
+            <a:fontRef idx="minor">
+              <a:schemeClr val="tx1"/>
+            </a:fontRef>
+          </p:style>
+        </p:cxnSp>
+      </p:grpSp>
+    </p:spTree>
+    <p:extLst>
+      <p:ext uri="{BB962C8B-B14F-4D97-AF65-F5344CB8AC3E}">
+        <p14:creationId xmlns:p14="http://schemas.microsoft.com/office/powerpoint/2010/main" val="3701518941"/>
       </p:ext>
     </p:extLst>
   </p:cSld>
@@ -4023,9 +5757,12 @@
 </file>
 
 <file path=customXml/item1.xml><?xml version="1.0" encoding="utf-8"?>
-<p:properties xmlns:p="http://schemas.microsoft.com/office/2006/metadata/properties" xmlns:xsi="http://www.w3.org/2001/XMLSchema-instance" xmlns:pc="http://schemas.microsoft.com/office/infopath/2007/PartnerControls">
-  <documentManagement/>
-</p:properties>
+<?mso-contentType ?>
+<FormTemplates xmlns="http://schemas.microsoft.com/sharepoint/v3/contenttype/forms">
+  <Display>DocumentLibraryForm</Display>
+  <Edit>DocumentLibraryForm</Edit>
+  <New>DocumentLibraryForm</New>
+</FormTemplates>
 </file>
 
 <file path=customXml/item2.xml><?xml version="1.0" encoding="utf-8"?>
@@ -4214,19 +5951,15 @@
 </file>
 
 <file path=customXml/item3.xml><?xml version="1.0" encoding="utf-8"?>
-<?mso-contentType ?>
-<FormTemplates xmlns="http://schemas.microsoft.com/sharepoint/v3/contenttype/forms">
-  <Display>DocumentLibraryForm</Display>
-  <Edit>DocumentLibraryForm</Edit>
-  <New>DocumentLibraryForm</New>
-</FormTemplates>
+<p:properties xmlns:p="http://schemas.microsoft.com/office/2006/metadata/properties" xmlns:xsi="http://www.w3.org/2001/XMLSchema-instance" xmlns:pc="http://schemas.microsoft.com/office/infopath/2007/PartnerControls">
+  <documentManagement/>
+</p:properties>
 </file>
 
 <file path=customXml/itemProps1.xml><?xml version="1.0" encoding="utf-8"?>
-<ds:datastoreItem xmlns:ds="http://schemas.openxmlformats.org/officeDocument/2006/customXml" ds:itemID="{DDC98385-43ED-45EE-86C3-4E9812F5FC61}">
+<ds:datastoreItem xmlns:ds="http://schemas.openxmlformats.org/officeDocument/2006/customXml" ds:itemID="{28CE17B3-286C-448C-B8BC-465193AC1BB3}">
   <ds:schemaRefs>
-    <ds:schemaRef ds:uri="http://schemas.microsoft.com/office/2006/metadata/properties"/>
-    <ds:schemaRef ds:uri="http://schemas.microsoft.com/office/infopath/2007/PartnerControls"/>
+    <ds:schemaRef ds:uri="http://schemas.microsoft.com/sharepoint/v3/contenttype/forms"/>
   </ds:schemaRefs>
 </ds:datastoreItem>
 </file>
@@ -4251,9 +5984,10 @@
 </file>
 
 <file path=customXml/itemProps3.xml><?xml version="1.0" encoding="utf-8"?>
-<ds:datastoreItem xmlns:ds="http://schemas.openxmlformats.org/officeDocument/2006/customXml" ds:itemID="{28CE17B3-286C-448C-B8BC-465193AC1BB3}">
+<ds:datastoreItem xmlns:ds="http://schemas.openxmlformats.org/officeDocument/2006/customXml" ds:itemID="{DDC98385-43ED-45EE-86C3-4E9812F5FC61}">
   <ds:schemaRefs>
-    <ds:schemaRef ds:uri="http://schemas.microsoft.com/sharepoint/v3/contenttype/forms"/>
+    <ds:schemaRef ds:uri="http://schemas.microsoft.com/office/2006/metadata/properties"/>
+    <ds:schemaRef ds:uri="http://schemas.microsoft.com/office/infopath/2007/PartnerControls"/>
   </ds:schemaRefs>
 </ds:datastoreItem>
 </file>
</xml_diff>